<commit_message>
new copy of the presentation
</commit_message>
<xml_diff>
--- a/Build Pathways.pptx
+++ b/Build Pathways.pptx
@@ -5,7 +5,7 @@
     <p:sldMasterId id="2147483648" r:id="rId1"/>
   </p:sldMasterIdLst>
   <p:notesMasterIdLst>
-    <p:notesMasterId r:id="rId25"/>
+    <p:notesMasterId r:id="rId26"/>
   </p:notesMasterIdLst>
   <p:sldIdLst>
     <p:sldId id="256" r:id="rId2"/>
@@ -30,7 +30,8 @@
     <p:sldId id="278" r:id="rId21"/>
     <p:sldId id="279" r:id="rId22"/>
     <p:sldId id="280" r:id="rId23"/>
-    <p:sldId id="281" r:id="rId24"/>
+    <p:sldId id="284" r:id="rId24"/>
+    <p:sldId id="281" r:id="rId25"/>
   </p:sldIdLst>
   <p:sldSz cx="12192000" cy="6858000"/>
   <p:notesSz cx="6858000" cy="9144000"/>
@@ -2643,10 +2644,10 @@
             </a:lnSpc>
           </a:pPr>
           <a:r>
-            <a:rPr lang="en-US" b="1"/>
+            <a:rPr lang="en-US" b="1" dirty="0"/>
             <a:t>How to fetch information from KEGG.</a:t>
           </a:r>
-          <a:endParaRPr lang="en-US"/>
+          <a:endParaRPr lang="en-US" dirty="0"/>
         </a:p>
       </dgm:t>
     </dgm:pt>
@@ -4383,10 +4384,10 @@
             <a:buNone/>
           </a:pPr>
           <a:r>
-            <a:rPr lang="en-US" sz="1800" b="1" kern="1200"/>
+            <a:rPr lang="en-US" sz="1800" b="1" kern="1200" dirty="0"/>
             <a:t>How to fetch information from KEGG.</a:t>
           </a:r>
-          <a:endParaRPr lang="en-US" sz="1800" kern="1200"/>
+          <a:endParaRPr lang="en-US" sz="1800" kern="1200" dirty="0"/>
         </a:p>
       </dsp:txBody>
       <dsp:txXfrm>
@@ -9826,7 +9827,7 @@
           <a:p>
             <a:fld id="{026835B0-1C0F-4DC1-A0C1-DE9198EF2D91}" type="datetimeFigureOut">
               <a:rPr lang="en-US" smtClean="0"/>
-              <a:t>10/17/2023</a:t>
+              <a:t>10/18/2023</a:t>
             </a:fld>
             <a:endParaRPr lang="en-US"/>
           </a:p>
@@ -10024,7 +10025,7 @@
           <a:p>
             <a:fld id="{026835B0-1C0F-4DC1-A0C1-DE9198EF2D91}" type="datetimeFigureOut">
               <a:rPr lang="en-US" smtClean="0"/>
-              <a:t>10/17/2023</a:t>
+              <a:t>10/18/2023</a:t>
             </a:fld>
             <a:endParaRPr lang="en-US"/>
           </a:p>
@@ -10232,7 +10233,7 @@
           <a:p>
             <a:fld id="{026835B0-1C0F-4DC1-A0C1-DE9198EF2D91}" type="datetimeFigureOut">
               <a:rPr lang="en-US" smtClean="0"/>
-              <a:t>10/17/2023</a:t>
+              <a:t>10/18/2023</a:t>
             </a:fld>
             <a:endParaRPr lang="en-US"/>
           </a:p>
@@ -10430,7 +10431,7 @@
           <a:p>
             <a:fld id="{026835B0-1C0F-4DC1-A0C1-DE9198EF2D91}" type="datetimeFigureOut">
               <a:rPr lang="en-US" smtClean="0"/>
-              <a:t>10/17/2023</a:t>
+              <a:t>10/18/2023</a:t>
             </a:fld>
             <a:endParaRPr lang="en-US"/>
           </a:p>
@@ -10705,7 +10706,7 @@
           <a:p>
             <a:fld id="{026835B0-1C0F-4DC1-A0C1-DE9198EF2D91}" type="datetimeFigureOut">
               <a:rPr lang="en-US" smtClean="0"/>
-              <a:t>10/17/2023</a:t>
+              <a:t>10/18/2023</a:t>
             </a:fld>
             <a:endParaRPr lang="en-US"/>
           </a:p>
@@ -10970,7 +10971,7 @@
           <a:p>
             <a:fld id="{026835B0-1C0F-4DC1-A0C1-DE9198EF2D91}" type="datetimeFigureOut">
               <a:rPr lang="en-US" smtClean="0"/>
-              <a:t>10/17/2023</a:t>
+              <a:t>10/18/2023</a:t>
             </a:fld>
             <a:endParaRPr lang="en-US"/>
           </a:p>
@@ -11382,7 +11383,7 @@
           <a:p>
             <a:fld id="{026835B0-1C0F-4DC1-A0C1-DE9198EF2D91}" type="datetimeFigureOut">
               <a:rPr lang="en-US" smtClean="0"/>
-              <a:t>10/17/2023</a:t>
+              <a:t>10/18/2023</a:t>
             </a:fld>
             <a:endParaRPr lang="en-US"/>
           </a:p>
@@ -11523,7 +11524,7 @@
           <a:p>
             <a:fld id="{026835B0-1C0F-4DC1-A0C1-DE9198EF2D91}" type="datetimeFigureOut">
               <a:rPr lang="en-US" smtClean="0"/>
-              <a:t>10/17/2023</a:t>
+              <a:t>10/18/2023</a:t>
             </a:fld>
             <a:endParaRPr lang="en-US"/>
           </a:p>
@@ -11636,7 +11637,7 @@
           <a:p>
             <a:fld id="{026835B0-1C0F-4DC1-A0C1-DE9198EF2D91}" type="datetimeFigureOut">
               <a:rPr lang="en-US" smtClean="0"/>
-              <a:t>10/17/2023</a:t>
+              <a:t>10/18/2023</a:t>
             </a:fld>
             <a:endParaRPr lang="en-US"/>
           </a:p>
@@ -11947,7 +11948,7 @@
           <a:p>
             <a:fld id="{026835B0-1C0F-4DC1-A0C1-DE9198EF2D91}" type="datetimeFigureOut">
               <a:rPr lang="en-US" smtClean="0"/>
-              <a:t>10/17/2023</a:t>
+              <a:t>10/18/2023</a:t>
             </a:fld>
             <a:endParaRPr lang="en-US"/>
           </a:p>
@@ -12235,7 +12236,7 @@
           <a:p>
             <a:fld id="{026835B0-1C0F-4DC1-A0C1-DE9198EF2D91}" type="datetimeFigureOut">
               <a:rPr lang="en-US" smtClean="0"/>
-              <a:t>10/17/2023</a:t>
+              <a:t>10/18/2023</a:t>
             </a:fld>
             <a:endParaRPr lang="en-US"/>
           </a:p>
@@ -12476,7 +12477,7 @@
           <a:p>
             <a:fld id="{026835B0-1C0F-4DC1-A0C1-DE9198EF2D91}" type="datetimeFigureOut">
               <a:rPr lang="en-US" smtClean="0"/>
-              <a:t>10/17/2023</a:t>
+              <a:t>10/18/2023</a:t>
             </a:fld>
             <a:endParaRPr lang="en-US"/>
           </a:p>
@@ -17482,6 +17483,11 @@
           </p:cNvGraphicFramePr>
           <p:nvPr>
             <p:ph idx="1"/>
+            <p:extLst>
+              <p:ext uri="{D42A27DB-BD31-4B8C-83A1-F6EECF244321}">
+                <p14:modId xmlns:p14="http://schemas.microsoft.com/office/powerpoint/2010/main" val="303005454"/>
+              </p:ext>
+            </p:extLst>
           </p:nvPr>
         </p:nvGraphicFramePr>
         <p:xfrm>
@@ -18584,6 +18590,239 @@
 </file>
 
 <file path=ppt/slides/slide23.xml><?xml version="1.0" encoding="utf-8"?>
+<p:sld xmlns:a="http://schemas.openxmlformats.org/drawingml/2006/main" xmlns:r="http://schemas.openxmlformats.org/officeDocument/2006/relationships" xmlns:p="http://schemas.openxmlformats.org/presentationml/2006/main">
+  <p:cSld>
+    <p:spTree>
+      <p:nvGrpSpPr>
+        <p:cNvPr id="1" name=""/>
+        <p:cNvGrpSpPr/>
+        <p:nvPr/>
+      </p:nvGrpSpPr>
+      <p:grpSpPr>
+        <a:xfrm>
+          <a:off x="0" y="0"/>
+          <a:ext cx="0" cy="0"/>
+          <a:chOff x="0" y="0"/>
+          <a:chExt cx="0" cy="0"/>
+        </a:xfrm>
+      </p:grpSpPr>
+      <p:sp>
+        <p:nvSpPr>
+          <p:cNvPr id="4" name="Rectangle 3">
+            <a:extLst>
+              <a:ext uri="{FF2B5EF4-FFF2-40B4-BE49-F238E27FC236}">
+                <a16:creationId xmlns:a16="http://schemas.microsoft.com/office/drawing/2014/main" id="{E006EFA0-9795-D3DD-85A2-5EB95F5DE172}"/>
+              </a:ext>
+            </a:extLst>
+          </p:cNvPr>
+          <p:cNvSpPr/>
+          <p:nvPr/>
+        </p:nvSpPr>
+        <p:spPr>
+          <a:xfrm>
+            <a:off x="1" y="1"/>
+            <a:ext cx="12192000" cy="6858000"/>
+          </a:xfrm>
+          <a:prstGeom prst="rect">
+            <a:avLst/>
+          </a:prstGeom>
+          <a:gradFill flip="none" rotWithShape="1">
+            <a:gsLst>
+              <a:gs pos="0">
+                <a:schemeClr val="accent3">
+                  <a:lumMod val="0"/>
+                  <a:lumOff val="100000"/>
+                </a:schemeClr>
+              </a:gs>
+              <a:gs pos="35000">
+                <a:schemeClr val="accent3">
+                  <a:lumMod val="0"/>
+                  <a:lumOff val="100000"/>
+                </a:schemeClr>
+              </a:gs>
+              <a:gs pos="99000">
+                <a:schemeClr val="accent3">
+                  <a:lumMod val="100000"/>
+                </a:schemeClr>
+              </a:gs>
+            </a:gsLst>
+            <a:path path="circle">
+              <a:fillToRect l="50000" t="-80000" r="50000" b="180000"/>
+            </a:path>
+            <a:tileRect/>
+          </a:gradFill>
+        </p:spPr>
+        <p:style>
+          <a:lnRef idx="2">
+            <a:schemeClr val="accent1">
+              <a:shade val="15000"/>
+            </a:schemeClr>
+          </a:lnRef>
+          <a:fillRef idx="1">
+            <a:schemeClr val="accent1"/>
+          </a:fillRef>
+          <a:effectRef idx="0">
+            <a:schemeClr val="accent1"/>
+          </a:effectRef>
+          <a:fontRef idx="minor">
+            <a:schemeClr val="lt1"/>
+          </a:fontRef>
+        </p:style>
+        <p:txBody>
+          <a:bodyPr rtlCol="0" anchor="ctr"/>
+          <a:lstStyle/>
+          <a:p>
+            <a:pPr algn="ctr"/>
+            <a:endParaRPr lang="en-US"/>
+          </a:p>
+        </p:txBody>
+      </p:sp>
+      <p:sp>
+        <p:nvSpPr>
+          <p:cNvPr id="2" name="Title 1">
+            <a:extLst>
+              <a:ext uri="{FF2B5EF4-FFF2-40B4-BE49-F238E27FC236}">
+                <a16:creationId xmlns:a16="http://schemas.microsoft.com/office/drawing/2014/main" id="{30820932-E4C1-0113-BAFC-97B904E06E7F}"/>
+              </a:ext>
+            </a:extLst>
+          </p:cNvPr>
+          <p:cNvSpPr>
+            <a:spLocks noGrp="1"/>
+          </p:cNvSpPr>
+          <p:nvPr>
+            <p:ph type="title"/>
+          </p:nvPr>
+        </p:nvSpPr>
+        <p:spPr/>
+        <p:txBody>
+          <a:bodyPr/>
+          <a:lstStyle/>
+          <a:p>
+            <a:r>
+              <a:rPr lang="en-US" sz="5400" b="1" dirty="0">
+                <a:solidFill>
+                  <a:schemeClr val="accent2"/>
+                </a:solidFill>
+              </a:rPr>
+              <a:t>References</a:t>
+            </a:r>
+            <a:endParaRPr lang="en-US" b="1" dirty="0">
+              <a:solidFill>
+                <a:schemeClr val="accent2"/>
+              </a:solidFill>
+            </a:endParaRPr>
+          </a:p>
+        </p:txBody>
+      </p:sp>
+      <p:sp>
+        <p:nvSpPr>
+          <p:cNvPr id="3" name="Content Placeholder 2">
+            <a:extLst>
+              <a:ext uri="{FF2B5EF4-FFF2-40B4-BE49-F238E27FC236}">
+                <a16:creationId xmlns:a16="http://schemas.microsoft.com/office/drawing/2014/main" id="{AF7B615B-319D-8D21-B14B-76B2B301D709}"/>
+              </a:ext>
+            </a:extLst>
+          </p:cNvPr>
+          <p:cNvSpPr>
+            <a:spLocks noGrp="1"/>
+          </p:cNvSpPr>
+          <p:nvPr>
+            <p:ph idx="1"/>
+          </p:nvPr>
+        </p:nvSpPr>
+        <p:spPr/>
+        <p:txBody>
+          <a:bodyPr>
+            <a:normAutofit/>
+          </a:bodyPr>
+          <a:lstStyle/>
+          <a:p>
+            <a:r>
+              <a:rPr lang="en-US" dirty="0"/>
+              <a:t>All the data and codes are here:</a:t>
+            </a:r>
+          </a:p>
+          <a:p>
+            <a:pPr lvl="1"/>
+            <a:r>
+              <a:rPr lang="en-US" dirty="0">
+                <a:hlinkClick r:id="rId2"/>
+              </a:rPr>
+              <a:t>https://github.com/Al-HassanK/COBRApy-Pathway-Builder/tree/master</a:t>
+            </a:r>
+            <a:endParaRPr lang="en-US" dirty="0"/>
+          </a:p>
+          <a:p>
+            <a:r>
+              <a:rPr lang="en-US" dirty="0">
+                <a:hlinkClick r:id="rId3"/>
+              </a:rPr>
+              <a:t>https://biopython.org/</a:t>
+            </a:r>
+            <a:endParaRPr lang="en-US" dirty="0"/>
+          </a:p>
+          <a:p>
+            <a:r>
+              <a:rPr lang="en-US" dirty="0">
+                <a:hlinkClick r:id="rId4"/>
+              </a:rPr>
+              <a:t>https://www.genome.jp/kegg/pathway.html</a:t>
+            </a:r>
+            <a:endParaRPr lang="en-US" dirty="0"/>
+          </a:p>
+          <a:p>
+            <a:r>
+              <a:rPr lang="en-US" dirty="0"/>
+              <a:t>Books:</a:t>
+            </a:r>
+          </a:p>
+          <a:p>
+            <a:pPr lvl="1"/>
+            <a:r>
+              <a:rPr lang="en-US" dirty="0"/>
+              <a:t>Systems Biology Constraint-based Reconstruction and Analysis by Bernhard O. </a:t>
+            </a:r>
+            <a:r>
+              <a:rPr lang="en-US" dirty="0" err="1"/>
+              <a:t>Palsson</a:t>
+            </a:r>
+            <a:endParaRPr lang="en-US" dirty="0"/>
+          </a:p>
+          <a:p>
+            <a:pPr lvl="1"/>
+            <a:r>
+              <a:rPr lang="en-US" dirty="0"/>
+              <a:t>Metabolic Engineering Principles And Methodologies by Gregory N. Stephanopoulos, Aristos A. </a:t>
+            </a:r>
+            <a:r>
+              <a:rPr lang="en-US" dirty="0" err="1"/>
+              <a:t>Aristidou</a:t>
+            </a:r>
+            <a:r>
+              <a:rPr lang="en-US" dirty="0"/>
+              <a:t>, and  Jens Nielsen.</a:t>
+            </a:r>
+          </a:p>
+          <a:p>
+            <a:pPr lvl="1"/>
+            <a:endParaRPr lang="en-US" dirty="0"/>
+          </a:p>
+        </p:txBody>
+      </p:sp>
+    </p:spTree>
+    <p:extLst>
+      <p:ext uri="{BB962C8B-B14F-4D97-AF65-F5344CB8AC3E}">
+        <p14:creationId xmlns:p14="http://schemas.microsoft.com/office/powerpoint/2010/main" val="2417974319"/>
+      </p:ext>
+    </p:extLst>
+  </p:cSld>
+  <p:clrMapOvr>
+    <a:masterClrMapping/>
+  </p:clrMapOvr>
+</p:sld>
+</file>
+
+<file path=ppt/slides/slide24.xml><?xml version="1.0" encoding="utf-8"?>
 <p:sld xmlns:a="http://schemas.openxmlformats.org/drawingml/2006/main" xmlns:r="http://schemas.openxmlformats.org/officeDocument/2006/relationships" xmlns:p="http://schemas.openxmlformats.org/presentationml/2006/main">
   <p:cSld>
     <p:bg>

</xml_diff>